<commit_message>
Update Think in EFW④EFWとスクリプト開発v0.1.pptx
</commit_message>
<xml_diff>
--- a/Think in EFW④EFWとスクリプト開発v0.1.pptx
+++ b/Think in EFW④EFWとスクリプト開発v0.1.pptx
@@ -8220,14 +8220,14 @@
           <p:nvPr>
             <p:extLst>
               <p:ext uri="{D42A27DB-BD31-4B8C-83A1-F6EECF244321}">
-                <p14:modId xmlns:p14="http://schemas.microsoft.com/office/powerpoint/2010/main" val="4221165086"/>
+                <p14:modId xmlns:p14="http://schemas.microsoft.com/office/powerpoint/2010/main" val="2901864323"/>
               </p:ext>
             </p:extLst>
           </p:nvPr>
         </p:nvGraphicFramePr>
         <p:xfrm>
           <a:off x="307974" y="1336324"/>
-          <a:ext cx="8573190" cy="2438400"/>
+          <a:ext cx="8573190" cy="2743200"/>
         </p:xfrm>
         <a:graphic>
           <a:graphicData uri="http://schemas.openxmlformats.org/drawingml/2006/table">
@@ -8236,21 +8236,21 @@
                 <a:tableStyleId>{5C22544A-7EE6-4342-B048-85BDC9FD1C3A}</a:tableStyleId>
               </a:tblPr>
               <a:tblGrid>
-                <a:gridCol w="1787526">
+                <a:gridCol w="2116819">
                   <a:extLst>
                     <a:ext uri="{9D8B030D-6E8A-4147-A177-3AD203B41FA5}">
                       <a16:colId xmlns:a16="http://schemas.microsoft.com/office/drawing/2014/main" val="1269148698"/>
                     </a:ext>
                   </a:extLst>
                 </a:gridCol>
-                <a:gridCol w="3244850">
+                <a:gridCol w="3453493">
                   <a:extLst>
                     <a:ext uri="{9D8B030D-6E8A-4147-A177-3AD203B41FA5}">
                       <a16:colId xmlns:a16="http://schemas.microsoft.com/office/drawing/2014/main" val="1541164166"/>
                     </a:ext>
                   </a:extLst>
                 </a:gridCol>
-                <a:gridCol w="3540814">
+                <a:gridCol w="3002878">
                   <a:extLst>
                     <a:ext uri="{9D8B030D-6E8A-4147-A177-3AD203B41FA5}">
                       <a16:colId xmlns:a16="http://schemas.microsoft.com/office/drawing/2014/main" val="1265032748"/>
@@ -8347,7 +8347,7 @@
                           <a:latin typeface="Meiryo UI" panose="020B0604030504040204" pitchFamily="50" charset="-128"/>
                           <a:ea typeface="Meiryo UI" panose="020B0604030504040204" pitchFamily="50" charset="-128"/>
                         </a:rPr>
-                        <a:t>8.1KL</a:t>
+                        <a:t>4.0KL</a:t>
                       </a:r>
                       <a:endParaRPr kumimoji="1" lang="ja-JP" altLang="en-US" sz="1400" dirty="0">
                         <a:latin typeface="Meiryo UI" panose="020B0604030504040204" pitchFamily="50" charset="-128"/>
@@ -8357,7 +8357,7 @@
                   </a:txBody>
                   <a:tcPr/>
                 </a:tc>
-                <a:tc rowSpan="2">
+                <a:tc rowSpan="3">
                   <a:txBody>
                     <a:bodyPr/>
                     <a:lstStyle/>
@@ -8374,7 +8374,7 @@
                           <a:latin typeface="Meiryo UI" panose="020B0604030504040204" pitchFamily="50" charset="-128"/>
                           <a:ea typeface="Meiryo UI" panose="020B0604030504040204" pitchFamily="50" charset="-128"/>
                         </a:rPr>
-                        <a:t>12.3KL</a:t>
+                        <a:t>8.4KL</a:t>
                       </a:r>
                       <a:endParaRPr kumimoji="1" lang="ja-JP" altLang="en-US" sz="1400" dirty="0">
                         <a:latin typeface="Meiryo UI" panose="020B0604030504040204" pitchFamily="50" charset="-128"/>
@@ -8390,7 +8390,7 @@
                   </a:ext>
                 </a:extLst>
               </a:tr>
-              <a:tr h="297943">
+              <a:tr h="152400">
                 <a:tc>
                   <a:txBody>
                     <a:bodyPr/>
@@ -8454,6 +8454,66 @@
                 <a:extLst>
                   <a:ext uri="{0D108BD9-81ED-4DB2-BD59-A6C34878D82A}">
                     <a16:rowId xmlns:a16="http://schemas.microsoft.com/office/drawing/2014/main" val="3736938860"/>
+                  </a:ext>
+                </a:extLst>
+              </a:tr>
+              <a:tr h="152400">
+                <a:tc>
+                  <a:txBody>
+                    <a:bodyPr/>
+                    <a:lstStyle/>
+                    <a:p>
+                      <a:r>
+                        <a:rPr kumimoji="1" lang="en-US" altLang="ja-JP" sz="1400" dirty="0" err="1">
+                          <a:latin typeface="Meiryo UI" panose="020B0604030504040204" pitchFamily="50" charset="-128"/>
+                          <a:ea typeface="Meiryo UI" panose="020B0604030504040204" pitchFamily="50" charset="-128"/>
+                        </a:rPr>
+                        <a:t>sh</a:t>
+                      </a:r>
+                      <a:r>
+                        <a:rPr kumimoji="1" lang="ja-JP" altLang="en-US" sz="1400" dirty="0">
+                          <a:latin typeface="Meiryo UI" panose="020B0604030504040204" pitchFamily="50" charset="-128"/>
+                          <a:ea typeface="Meiryo UI" panose="020B0604030504040204" pitchFamily="50" charset="-128"/>
+                        </a:rPr>
+                        <a:t>ファイル</a:t>
+                      </a:r>
+                    </a:p>
+                  </a:txBody>
+                  <a:tcPr/>
+                </a:tc>
+                <a:tc>
+                  <a:txBody>
+                    <a:bodyPr/>
+                    <a:lstStyle/>
+                    <a:p>
+                      <a:r>
+                        <a:rPr kumimoji="1" lang="en-US" altLang="ja-JP" sz="1400" dirty="0">
+                          <a:latin typeface="Meiryo UI" panose="020B0604030504040204" pitchFamily="50" charset="-128"/>
+                          <a:ea typeface="Meiryo UI" panose="020B0604030504040204" pitchFamily="50" charset="-128"/>
+                        </a:rPr>
+                        <a:t>0.2KL</a:t>
+                      </a:r>
+                      <a:endParaRPr kumimoji="1" lang="ja-JP" altLang="en-US" sz="1400" dirty="0">
+                        <a:latin typeface="Meiryo UI" panose="020B0604030504040204" pitchFamily="50" charset="-128"/>
+                        <a:ea typeface="Meiryo UI" panose="020B0604030504040204" pitchFamily="50" charset="-128"/>
+                      </a:endParaRPr>
+                    </a:p>
+                  </a:txBody>
+                  <a:tcPr/>
+                </a:tc>
+                <a:tc vMerge="1">
+                  <a:txBody>
+                    <a:bodyPr/>
+                    <a:lstStyle/>
+                    <a:p>
+                      <a:endParaRPr kumimoji="1" lang="ja-JP" altLang="en-US"/>
+                    </a:p>
+                  </a:txBody>
+                  <a:tcPr/>
+                </a:tc>
+                <a:extLst>
+                  <a:ext uri="{0D108BD9-81ED-4DB2-BD59-A6C34878D82A}">
+                    <a16:rowId xmlns:a16="http://schemas.microsoft.com/office/drawing/2014/main" val="1321671845"/>
                   </a:ext>
                 </a:extLst>
               </a:tr>
@@ -8791,7 +8851,7 @@
         </p:nvSpPr>
         <p:spPr>
           <a:xfrm>
-            <a:off x="307974" y="3813337"/>
+            <a:off x="307974" y="4107251"/>
             <a:ext cx="8573192" cy="307777"/>
           </a:xfrm>
           <a:prstGeom prst="rect">
@@ -8834,13 +8894,13 @@
           <p:nvPr>
             <p:extLst>
               <p:ext uri="{D42A27DB-BD31-4B8C-83A1-F6EECF244321}">
-                <p14:modId xmlns:p14="http://schemas.microsoft.com/office/powerpoint/2010/main" val="2015833267"/>
+                <p14:modId xmlns:p14="http://schemas.microsoft.com/office/powerpoint/2010/main" val="190000900"/>
               </p:ext>
             </p:extLst>
           </p:nvPr>
         </p:nvGraphicFramePr>
         <p:xfrm>
-          <a:off x="307974" y="4146915"/>
+          <a:off x="307974" y="4391843"/>
           <a:ext cx="8573190" cy="2200957"/>
         </p:xfrm>
         <a:graphic>

</xml_diff>